<commit_message>
Upgraded to 1.5.1 of Webhooks
</commit_message>
<xml_diff>
--- a/docs/images/Webhooks.pptx
+++ b/docs/images/Webhooks.pptx
@@ -243,7 +243,7 @@
           <a:p>
             <a:fld id="{5AB5B4D5-9222-407A-89D1-F2D904E4B81A}" type="datetimeFigureOut">
               <a:rPr lang="en-US" smtClean="0"/>
-              <a:t>3/3/2017</a:t>
+              <a:t>3/9/2017</a:t>
             </a:fld>
             <a:endParaRPr lang="en-US"/>
           </a:p>
@@ -411,7 +411,7 @@
           <a:p>
             <a:fld id="{5AB5B4D5-9222-407A-89D1-F2D904E4B81A}" type="datetimeFigureOut">
               <a:rPr lang="en-US" smtClean="0"/>
-              <a:t>3/3/2017</a:t>
+              <a:t>3/9/2017</a:t>
             </a:fld>
             <a:endParaRPr lang="en-US"/>
           </a:p>
@@ -589,7 +589,7 @@
           <a:p>
             <a:fld id="{5AB5B4D5-9222-407A-89D1-F2D904E4B81A}" type="datetimeFigureOut">
               <a:rPr lang="en-US" smtClean="0"/>
-              <a:t>3/3/2017</a:t>
+              <a:t>3/9/2017</a:t>
             </a:fld>
             <a:endParaRPr lang="en-US"/>
           </a:p>
@@ -757,7 +757,7 @@
           <a:p>
             <a:fld id="{5AB5B4D5-9222-407A-89D1-F2D904E4B81A}" type="datetimeFigureOut">
               <a:rPr lang="en-US" smtClean="0"/>
-              <a:t>3/3/2017</a:t>
+              <a:t>3/9/2017</a:t>
             </a:fld>
             <a:endParaRPr lang="en-US"/>
           </a:p>
@@ -1002,7 +1002,7 @@
           <a:p>
             <a:fld id="{5AB5B4D5-9222-407A-89D1-F2D904E4B81A}" type="datetimeFigureOut">
               <a:rPr lang="en-US" smtClean="0"/>
-              <a:t>3/3/2017</a:t>
+              <a:t>3/9/2017</a:t>
             </a:fld>
             <a:endParaRPr lang="en-US"/>
           </a:p>
@@ -1231,7 +1231,7 @@
           <a:p>
             <a:fld id="{5AB5B4D5-9222-407A-89D1-F2D904E4B81A}" type="datetimeFigureOut">
               <a:rPr lang="en-US" smtClean="0"/>
-              <a:t>3/3/2017</a:t>
+              <a:t>3/9/2017</a:t>
             </a:fld>
             <a:endParaRPr lang="en-US"/>
           </a:p>
@@ -1595,7 +1595,7 @@
           <a:p>
             <a:fld id="{5AB5B4D5-9222-407A-89D1-F2D904E4B81A}" type="datetimeFigureOut">
               <a:rPr lang="en-US" smtClean="0"/>
-              <a:t>3/3/2017</a:t>
+              <a:t>3/9/2017</a:t>
             </a:fld>
             <a:endParaRPr lang="en-US"/>
           </a:p>
@@ -1712,7 +1712,7 @@
           <a:p>
             <a:fld id="{5AB5B4D5-9222-407A-89D1-F2D904E4B81A}" type="datetimeFigureOut">
               <a:rPr lang="en-US" smtClean="0"/>
-              <a:t>3/3/2017</a:t>
+              <a:t>3/9/2017</a:t>
             </a:fld>
             <a:endParaRPr lang="en-US"/>
           </a:p>
@@ -1807,7 +1807,7 @@
           <a:p>
             <a:fld id="{5AB5B4D5-9222-407A-89D1-F2D904E4B81A}" type="datetimeFigureOut">
               <a:rPr lang="en-US" smtClean="0"/>
-              <a:t>3/3/2017</a:t>
+              <a:t>3/9/2017</a:t>
             </a:fld>
             <a:endParaRPr lang="en-US"/>
           </a:p>
@@ -2082,7 +2082,7 @@
           <a:p>
             <a:fld id="{5AB5B4D5-9222-407A-89D1-F2D904E4B81A}" type="datetimeFigureOut">
               <a:rPr lang="en-US" smtClean="0"/>
-              <a:t>3/3/2017</a:t>
+              <a:t>3/9/2017</a:t>
             </a:fld>
             <a:endParaRPr lang="en-US"/>
           </a:p>
@@ -2334,7 +2334,7 @@
           <a:p>
             <a:fld id="{5AB5B4D5-9222-407A-89D1-F2D904E4B81A}" type="datetimeFigureOut">
               <a:rPr lang="en-US" smtClean="0"/>
-              <a:t>3/3/2017</a:t>
+              <a:t>3/9/2017</a:t>
             </a:fld>
             <a:endParaRPr lang="en-US"/>
           </a:p>
@@ -2545,7 +2545,7 @@
           <a:p>
             <a:fld id="{5AB5B4D5-9222-407A-89D1-F2D904E4B81A}" type="datetimeFigureOut">
               <a:rPr lang="en-US" smtClean="0"/>
-              <a:t>3/3/2017</a:t>
+              <a:t>3/9/2017</a:t>
             </a:fld>
             <a:endParaRPr lang="en-US"/>
           </a:p>
@@ -3505,7 +3505,7 @@
         <p:spPr>
           <a:xfrm>
             <a:off x="4067027" y="2138320"/>
-            <a:ext cx="1900970" cy="461665"/>
+            <a:ext cx="2585901" cy="276999"/>
           </a:xfrm>
           <a:prstGeom prst="rect">
             <a:avLst/>
@@ -3524,15 +3524,12 @@
               <a:rPr lang="en-US" sz="1200" i="1" dirty="0" err="1"/>
               <a:t>IWebhooks</a:t>
             </a:r>
-            <a:endParaRPr lang="en-US" sz="1200" i="1" dirty="0"/>
-          </a:p>
-          <a:p>
-            <a:r>
-              <a:rPr lang="en-US" sz="1200" dirty="0"/>
+            <a:r>
+              <a:rPr lang="en-US" sz="1200" dirty="0" err="1"/>
               <a:t>.</a:t>
             </a:r>
             <a:r>
-              <a:rPr lang="en-US" sz="1200" b="1" dirty="0"/>
+              <a:rPr lang="en-US" sz="1200" b="1" dirty="0" err="1"/>
               <a:t>Publish</a:t>
             </a:r>
             <a:r>
@@ -3558,8 +3555,8 @@
         </p:nvSpPr>
         <p:spPr>
           <a:xfrm>
-            <a:off x="4067027" y="3680090"/>
-            <a:ext cx="1844608" cy="461665"/>
+            <a:off x="4067026" y="3680090"/>
+            <a:ext cx="2417659" cy="276999"/>
           </a:xfrm>
           <a:prstGeom prst="rect">
             <a:avLst/>
@@ -3569,24 +3566,21 @@
           </a:solidFill>
         </p:spPr>
         <p:txBody>
-          <a:bodyPr wrap="none" rtlCol="0">
+          <a:bodyPr wrap="square" rtlCol="0">
             <a:spAutoFit/>
           </a:bodyPr>
           <a:lstStyle/>
           <a:p>
             <a:r>
               <a:rPr lang="en-US" sz="1200" i="1" dirty="0" err="1"/>
-              <a:t>IWebhookEventSink</a:t>
-            </a:r>
-            <a:endParaRPr lang="en-US" sz="1200" i="1" dirty="0"/>
-          </a:p>
-          <a:p>
-            <a:r>
-              <a:rPr lang="en-US" sz="1200" dirty="0"/>
+              <a:t>IEventSink</a:t>
+            </a:r>
+            <a:r>
+              <a:rPr lang="en-US" sz="1200" dirty="0" err="1"/>
               <a:t>.</a:t>
             </a:r>
             <a:r>
-              <a:rPr lang="en-US" sz="1200" b="1" dirty="0"/>
+              <a:rPr lang="en-US" sz="1200" b="1" dirty="0" err="1"/>
               <a:t>Write</a:t>
             </a:r>
             <a:r>
@@ -3656,7 +3650,7 @@
         <p:spPr>
           <a:xfrm>
             <a:off x="0" y="2461486"/>
-            <a:ext cx="1893595" cy="276999"/>
+            <a:ext cx="1305037" cy="276999"/>
           </a:xfrm>
           <a:prstGeom prst="rect">
             <a:avLst/>
@@ -3673,7 +3667,7 @@
           <a:p>
             <a:r>
               <a:rPr lang="en-US" sz="1200" i="1" dirty="0" err="1"/>
-              <a:t>IWebhookSubscriptionStore</a:t>
+              <a:t>ISubscriptionStore</a:t>
             </a:r>
             <a:endParaRPr lang="en-US" sz="1200" dirty="0"/>
           </a:p>
@@ -4386,7 +4380,7 @@
         <p:spPr>
           <a:xfrm>
             <a:off x="4067027" y="2138320"/>
-            <a:ext cx="1900970" cy="461665"/>
+            <a:ext cx="2585901" cy="276999"/>
           </a:xfrm>
           <a:prstGeom prst="rect">
             <a:avLst/>
@@ -4405,15 +4399,12 @@
               <a:rPr lang="en-US" sz="1200" i="1" dirty="0" err="1"/>
               <a:t>IWebhooks</a:t>
             </a:r>
-            <a:endParaRPr lang="en-US" sz="1200" i="1" dirty="0"/>
-          </a:p>
-          <a:p>
-            <a:r>
-              <a:rPr lang="en-US" sz="1200" dirty="0"/>
+            <a:r>
+              <a:rPr lang="en-US" sz="1200" dirty="0" err="1"/>
               <a:t>.</a:t>
             </a:r>
             <a:r>
-              <a:rPr lang="en-US" sz="1200" b="1" dirty="0"/>
+              <a:rPr lang="en-US" sz="1200" b="1" dirty="0" err="1"/>
               <a:t>Publish</a:t>
             </a:r>
             <a:r>
@@ -4440,7 +4431,7 @@
         <p:spPr>
           <a:xfrm>
             <a:off x="4067027" y="3680090"/>
-            <a:ext cx="1844608" cy="461665"/>
+            <a:ext cx="2422073" cy="276999"/>
           </a:xfrm>
           <a:prstGeom prst="rect">
             <a:avLst/>
@@ -4457,17 +4448,14 @@
           <a:p>
             <a:r>
               <a:rPr lang="en-US" sz="1200" i="1" dirty="0" err="1"/>
-              <a:t>IWebhookEventSink</a:t>
-            </a:r>
-            <a:endParaRPr lang="en-US" sz="1200" i="1" dirty="0"/>
-          </a:p>
-          <a:p>
-            <a:r>
-              <a:rPr lang="en-US" sz="1200" dirty="0"/>
+              <a:t>IEventSink</a:t>
+            </a:r>
+            <a:r>
+              <a:rPr lang="en-US" sz="1200" dirty="0" err="1"/>
               <a:t>.</a:t>
             </a:r>
             <a:r>
-              <a:rPr lang="en-US" sz="1200" b="1" dirty="0"/>
+              <a:rPr lang="en-US" sz="1200" b="1" dirty="0" err="1"/>
               <a:t>Write</a:t>
             </a:r>
             <a:r>
@@ -4493,8 +4481,8 @@
         </p:nvSpPr>
         <p:spPr>
           <a:xfrm>
-            <a:off x="1295365" y="4768736"/>
-            <a:ext cx="1506118" cy="461665"/>
+            <a:off x="1113757" y="4768736"/>
+            <a:ext cx="1701556" cy="1015663"/>
           </a:xfrm>
           <a:prstGeom prst="rect">
             <a:avLst/>
@@ -4537,6 +4525,33 @@
             <a:r>
               <a:rPr lang="en-US" sz="1200" dirty="0"/>
               <a:t>);</a:t>
+            </a:r>
+          </a:p>
+          <a:p>
+            <a:pPr algn="ctr"/>
+            <a:endParaRPr lang="en-US" sz="1200" dirty="0"/>
+          </a:p>
+          <a:p>
+            <a:pPr algn="ctr"/>
+            <a:r>
+              <a:rPr lang="en-US" sz="1200" i="1" dirty="0" err="1"/>
+              <a:t>SubscriptionService</a:t>
+            </a:r>
+            <a:endParaRPr lang="en-US" sz="1200" i="1" dirty="0"/>
+          </a:p>
+          <a:p>
+            <a:pPr algn="ctr"/>
+            <a:r>
+              <a:rPr lang="en-US" sz="1200" dirty="0"/>
+              <a:t>.</a:t>
+            </a:r>
+            <a:r>
+              <a:rPr lang="en-US" sz="1200" b="1" dirty="0" err="1"/>
+              <a:t>UpdateResults</a:t>
+            </a:r>
+            <a:r>
+              <a:rPr lang="en-US" sz="1200" dirty="0"/>
+              <a:t>(results);</a:t>
             </a:r>
           </a:p>
         </p:txBody>
@@ -4593,7 +4608,7 @@
         <p:spPr>
           <a:xfrm>
             <a:off x="0" y="2461486"/>
-            <a:ext cx="1893595" cy="276999"/>
+            <a:ext cx="1305037" cy="276999"/>
           </a:xfrm>
           <a:prstGeom prst="rect">
             <a:avLst/>
@@ -4610,7 +4625,7 @@
           <a:p>
             <a:r>
               <a:rPr lang="en-US" sz="1200" i="1" dirty="0" err="1"/>
-              <a:t>IWebhookSubscriptionStore</a:t>
+              <a:t>ISubscriptionStore</a:t>
             </a:r>
             <a:endParaRPr lang="en-US" sz="1200" dirty="0"/>
           </a:p>
@@ -5414,7 +5429,7 @@
           <a:p>
             <a:r>
               <a:rPr lang="en-US" sz="1200" i="1" dirty="0" err="1"/>
-              <a:t>IWebhookEventSink</a:t>
+              <a:t>IEventSink</a:t>
             </a:r>
             <a:endParaRPr lang="en-US" sz="1200" i="1" dirty="0"/>
           </a:p>
@@ -5863,7 +5878,7 @@
         <p:spPr>
           <a:xfrm>
             <a:off x="-3975" y="3652670"/>
-            <a:ext cx="1893595" cy="276999"/>
+            <a:ext cx="1305037" cy="276999"/>
           </a:xfrm>
           <a:prstGeom prst="rect">
             <a:avLst/>
@@ -5880,7 +5895,40 @@
           <a:p>
             <a:r>
               <a:rPr lang="en-US" sz="1200" i="1" dirty="0" err="1"/>
-              <a:t>IWebhookSubscriptionStore</a:t>
+              <a:t>ISubscriptionStore</a:t>
+            </a:r>
+            <a:endParaRPr lang="en-US" sz="1200" dirty="0"/>
+          </a:p>
+        </p:txBody>
+      </p:sp>
+      <p:sp>
+        <p:nvSpPr>
+          <p:cNvPr id="35" name="TextBox 34"/>
+          <p:cNvSpPr txBox="1"/>
+          <p:nvPr/>
+        </p:nvSpPr>
+        <p:spPr>
+          <a:xfrm>
+            <a:off x="2821609" y="947597"/>
+            <a:ext cx="2185663" cy="276999"/>
+          </a:xfrm>
+          <a:prstGeom prst="rect">
+            <a:avLst/>
+          </a:prstGeom>
+          <a:solidFill>
+            <a:schemeClr val="bg1"/>
+          </a:solidFill>
+        </p:spPr>
+        <p:txBody>
+          <a:bodyPr wrap="none" rtlCol="0">
+            <a:spAutoFit/>
+          </a:bodyPr>
+          <a:lstStyle/>
+          <a:p>
+            <a:pPr algn="ctr"/>
+            <a:r>
+              <a:rPr lang="en-US" sz="1200" i="1" dirty="0"/>
+              <a:t>HTTP PUT /subscriptions/history</a:t>
             </a:r>
             <a:endParaRPr lang="en-US" sz="1200" dirty="0"/>
           </a:p>

</xml_diff>